<commit_message>
Fri Mar 24 16:44:58 EDT 2017
</commit_message>
<xml_diff>
--- a/various/pptx/coherency_VS_rank.pptx
+++ b/various/pptx/coherency_VS_rank.pptx
@@ -2,7 +2,7 @@
 <file path=ppt/presentation.xml><?xml version="1.0" encoding="utf-8"?>
 <p:presentation xmlns:a="http://schemas.openxmlformats.org/drawingml/2006/main" xmlns:r="http://schemas.openxmlformats.org/officeDocument/2006/relationships" xmlns:p="http://schemas.openxmlformats.org/presentationml/2006/main" saveSubsetFonts="1" autoCompressPictures="0">
   <p:sldMasterIdLst>
-    <p:sldMasterId id="2147483684" r:id="rId1"/>
+    <p:sldMasterId id="2147483780" r:id="rId1"/>
   </p:sldMasterIdLst>
   <p:sldIdLst>
     <p:sldId id="256" r:id="rId2"/>
@@ -104,6 +104,11 @@
       </a:defRPr>
     </a:lvl9pPr>
   </p:defaultTextStyle>
+  <p:extLst>
+    <p:ext uri="{EFAFB233-063F-42B5-8137-9DF3F51BA10A}">
+      <p15:sldGuideLst xmlns:p15="http://schemas.microsoft.com/office/powerpoint/2012/main"/>
+    </p:ext>
+  </p:extLst>
 </p:presentation>
 </file>
 
@@ -136,15 +141,15 @@
         </p:nvSpPr>
         <p:spPr>
           <a:xfrm>
-            <a:off x="514350" y="1346836"/>
-            <a:ext cx="5829300" cy="2865120"/>
+            <a:off x="857250" y="1346836"/>
+            <a:ext cx="5143500" cy="2865120"/>
           </a:xfrm>
         </p:spPr>
         <p:txBody>
           <a:bodyPr anchor="b"/>
           <a:lstStyle>
             <a:lvl1pPr algn="ctr">
-              <a:defRPr sz="4500"/>
+              <a:defRPr sz="3375"/>
             </a:lvl1pPr>
           </a:lstStyle>
           <a:p>
@@ -152,7 +157,7 @@
               <a:rPr lang="en-US" smtClean="0"/>
               <a:t>Click to edit Master title style</a:t>
             </a:r>
-            <a:endParaRPr lang="en-US" dirty="0"/>
+            <a:endParaRPr lang="en-US"/>
           </a:p>
         </p:txBody>
       </p:sp>
@@ -177,39 +182,39 @@
           <a:lstStyle>
             <a:lvl1pPr marL="0" indent="0" algn="ctr">
               <a:buNone/>
-              <a:defRPr sz="1800"/>
+              <a:defRPr sz="1350"/>
             </a:lvl1pPr>
-            <a:lvl2pPr marL="342900" indent="0" algn="ctr">
-              <a:buNone/>
-              <a:defRPr sz="1500"/>
+            <a:lvl2pPr marL="257175" indent="0" algn="ctr">
+              <a:buNone/>
+              <a:defRPr sz="1125"/>
             </a:lvl2pPr>
-            <a:lvl3pPr marL="685800" indent="0" algn="ctr">
-              <a:buNone/>
-              <a:defRPr sz="1350"/>
+            <a:lvl3pPr marL="514350" indent="0" algn="ctr">
+              <a:buNone/>
+              <a:defRPr sz="1013"/>
             </a:lvl3pPr>
-            <a:lvl4pPr marL="1028700" indent="0" algn="ctr">
-              <a:buNone/>
-              <a:defRPr sz="1200"/>
+            <a:lvl4pPr marL="771525" indent="0" algn="ctr">
+              <a:buNone/>
+              <a:defRPr sz="900"/>
             </a:lvl4pPr>
-            <a:lvl5pPr marL="1371600" indent="0" algn="ctr">
-              <a:buNone/>
-              <a:defRPr sz="1200"/>
+            <a:lvl5pPr marL="1028700" indent="0" algn="ctr">
+              <a:buNone/>
+              <a:defRPr sz="900"/>
             </a:lvl5pPr>
-            <a:lvl6pPr marL="1714500" indent="0" algn="ctr">
-              <a:buNone/>
-              <a:defRPr sz="1200"/>
+            <a:lvl6pPr marL="1285875" indent="0" algn="ctr">
+              <a:buNone/>
+              <a:defRPr sz="900"/>
             </a:lvl6pPr>
-            <a:lvl7pPr marL="2057400" indent="0" algn="ctr">
-              <a:buNone/>
-              <a:defRPr sz="1200"/>
+            <a:lvl7pPr marL="1543050" indent="0" algn="ctr">
+              <a:buNone/>
+              <a:defRPr sz="900"/>
             </a:lvl7pPr>
-            <a:lvl8pPr marL="2400300" indent="0" algn="ctr">
-              <a:buNone/>
-              <a:defRPr sz="1200"/>
+            <a:lvl8pPr marL="1800225" indent="0" algn="ctr">
+              <a:buNone/>
+              <a:defRPr sz="900"/>
             </a:lvl8pPr>
-            <a:lvl9pPr marL="2743200" indent="0" algn="ctr">
-              <a:buNone/>
-              <a:defRPr sz="1200"/>
+            <a:lvl9pPr marL="2057400" indent="0" algn="ctr">
+              <a:buNone/>
+              <a:defRPr sz="900"/>
             </a:lvl9pPr>
           </a:lstStyle>
           <a:p>
@@ -217,7 +222,7 @@
               <a:rPr lang="en-US" smtClean="0"/>
               <a:t>Click to edit Master subtitle style</a:t>
             </a:r>
-            <a:endParaRPr lang="en-US" dirty="0"/>
+            <a:endParaRPr lang="en-US"/>
           </a:p>
         </p:txBody>
       </p:sp>
@@ -238,7 +243,7 @@
           <a:p>
             <a:fld id="{963322A3-F8A4-4C4A-B54B-91A1EA6C418E}" type="datetimeFigureOut">
               <a:rPr lang="en-US" smtClean="0"/>
-              <a:t>3/18/17</a:t>
+              <a:t>3/24/17</a:t>
             </a:fld>
             <a:endParaRPr lang="en-US"/>
           </a:p>
@@ -330,7 +335,7 @@
               <a:rPr lang="en-US" smtClean="0"/>
               <a:t>Click to edit Master title style</a:t>
             </a:r>
-            <a:endParaRPr lang="en-US" dirty="0"/>
+            <a:endParaRPr lang="en-US"/>
           </a:p>
         </p:txBody>
       </p:sp>
@@ -382,7 +387,7 @@
               <a:rPr lang="en-US" smtClean="0"/>
               <a:t>Fifth level</a:t>
             </a:r>
-            <a:endParaRPr lang="en-US" dirty="0"/>
+            <a:endParaRPr lang="en-US"/>
           </a:p>
         </p:txBody>
       </p:sp>
@@ -403,7 +408,7 @@
           <a:p>
             <a:fld id="{963322A3-F8A4-4C4A-B54B-91A1EA6C418E}" type="datetimeFigureOut">
               <a:rPr lang="en-US" smtClean="0"/>
-              <a:t>3/18/17</a:t>
+              <a:t>3/24/17</a:t>
             </a:fld>
             <a:endParaRPr lang="en-US"/>
           </a:p>
@@ -488,7 +493,7 @@
         </p:nvSpPr>
         <p:spPr>
           <a:xfrm>
-            <a:off x="4907757" y="438150"/>
+            <a:off x="4907756" y="438150"/>
             <a:ext cx="1478756" cy="6974206"/>
           </a:xfrm>
         </p:spPr>
@@ -500,7 +505,7 @@
               <a:rPr lang="en-US" smtClean="0"/>
               <a:t>Click to edit Master title style</a:t>
             </a:r>
-            <a:endParaRPr lang="en-US" dirty="0"/>
+            <a:endParaRPr lang="en-US"/>
           </a:p>
         </p:txBody>
       </p:sp>
@@ -516,7 +521,7 @@
         </p:nvSpPr>
         <p:spPr>
           <a:xfrm>
-            <a:off x="471488" y="438150"/>
+            <a:off x="471487" y="438150"/>
             <a:ext cx="4350544" cy="6974206"/>
           </a:xfrm>
         </p:spPr>
@@ -557,7 +562,7 @@
               <a:rPr lang="en-US" smtClean="0"/>
               <a:t>Fifth level</a:t>
             </a:r>
-            <a:endParaRPr lang="en-US" dirty="0"/>
+            <a:endParaRPr lang="en-US"/>
           </a:p>
         </p:txBody>
       </p:sp>
@@ -578,7 +583,7 @@
           <a:p>
             <a:fld id="{963322A3-F8A4-4C4A-B54B-91A1EA6C418E}" type="datetimeFigureOut">
               <a:rPr lang="en-US" smtClean="0"/>
-              <a:t>3/18/17</a:t>
+              <a:t>3/24/17</a:t>
             </a:fld>
             <a:endParaRPr lang="en-US"/>
           </a:p>
@@ -670,7 +675,7 @@
               <a:rPr lang="en-US" smtClean="0"/>
               <a:t>Click to edit Master title style</a:t>
             </a:r>
-            <a:endParaRPr lang="en-US" dirty="0"/>
+            <a:endParaRPr lang="en-US"/>
           </a:p>
         </p:txBody>
       </p:sp>
@@ -722,7 +727,7 @@
               <a:rPr lang="en-US" smtClean="0"/>
               <a:t>Fifth level</a:t>
             </a:r>
-            <a:endParaRPr lang="en-US" dirty="0"/>
+            <a:endParaRPr lang="en-US"/>
           </a:p>
         </p:txBody>
       </p:sp>
@@ -743,7 +748,7 @@
           <a:p>
             <a:fld id="{963322A3-F8A4-4C4A-B54B-91A1EA6C418E}" type="datetimeFigureOut">
               <a:rPr lang="en-US" smtClean="0"/>
-              <a:t>3/18/17</a:t>
+              <a:t>3/24/17</a:t>
             </a:fld>
             <a:endParaRPr lang="en-US"/>
           </a:p>
@@ -828,7 +833,7 @@
         </p:nvSpPr>
         <p:spPr>
           <a:xfrm>
-            <a:off x="467916" y="2051688"/>
+            <a:off x="467916" y="2051686"/>
             <a:ext cx="5915025" cy="3423284"/>
           </a:xfrm>
         </p:spPr>
@@ -836,7 +841,7 @@
           <a:bodyPr anchor="b"/>
           <a:lstStyle>
             <a:lvl1pPr>
-              <a:defRPr sz="4500"/>
+              <a:defRPr sz="3375"/>
             </a:lvl1pPr>
           </a:lstStyle>
           <a:p>
@@ -844,7 +849,7 @@
               <a:rPr lang="en-US" smtClean="0"/>
               <a:t>Click to edit Master title style</a:t>
             </a:r>
-            <a:endParaRPr lang="en-US" dirty="0"/>
+            <a:endParaRPr lang="en-US"/>
           </a:p>
         </p:txBody>
       </p:sp>
@@ -860,7 +865,7 @@
         </p:nvSpPr>
         <p:spPr>
           <a:xfrm>
-            <a:off x="467916" y="5507358"/>
+            <a:off x="467916" y="5507356"/>
             <a:ext cx="5915025" cy="1800224"/>
           </a:xfrm>
         </p:spPr>
@@ -869,15 +874,17 @@
           <a:lstStyle>
             <a:lvl1pPr marL="0" indent="0">
               <a:buNone/>
-              <a:defRPr sz="1800">
+              <a:defRPr sz="1350">
                 <a:solidFill>
-                  <a:schemeClr val="tx1"/>
+                  <a:schemeClr val="tx1">
+                    <a:tint val="75000"/>
+                  </a:schemeClr>
                 </a:solidFill>
               </a:defRPr>
             </a:lvl1pPr>
-            <a:lvl2pPr marL="342900" indent="0">
-              <a:buNone/>
-              <a:defRPr sz="1500">
+            <a:lvl2pPr marL="257175" indent="0">
+              <a:buNone/>
+              <a:defRPr sz="1125">
                 <a:solidFill>
                   <a:schemeClr val="tx1">
                     <a:tint val="75000"/>
@@ -885,9 +892,9 @@
                 </a:solidFill>
               </a:defRPr>
             </a:lvl2pPr>
-            <a:lvl3pPr marL="685800" indent="0">
-              <a:buNone/>
-              <a:defRPr sz="1350">
+            <a:lvl3pPr marL="514350" indent="0">
+              <a:buNone/>
+              <a:defRPr sz="1013">
                 <a:solidFill>
                   <a:schemeClr val="tx1">
                     <a:tint val="75000"/>
@@ -895,9 +902,9 @@
                 </a:solidFill>
               </a:defRPr>
             </a:lvl3pPr>
-            <a:lvl4pPr marL="1028700" indent="0">
-              <a:buNone/>
-              <a:defRPr sz="1200">
+            <a:lvl4pPr marL="771525" indent="0">
+              <a:buNone/>
+              <a:defRPr sz="900">
                 <a:solidFill>
                   <a:schemeClr val="tx1">
                     <a:tint val="75000"/>
@@ -905,9 +912,9 @@
                 </a:solidFill>
               </a:defRPr>
             </a:lvl4pPr>
-            <a:lvl5pPr marL="1371600" indent="0">
-              <a:buNone/>
-              <a:defRPr sz="1200">
+            <a:lvl5pPr marL="1028700" indent="0">
+              <a:buNone/>
+              <a:defRPr sz="900">
                 <a:solidFill>
                   <a:schemeClr val="tx1">
                     <a:tint val="75000"/>
@@ -915,9 +922,9 @@
                 </a:solidFill>
               </a:defRPr>
             </a:lvl5pPr>
-            <a:lvl6pPr marL="1714500" indent="0">
-              <a:buNone/>
-              <a:defRPr sz="1200">
+            <a:lvl6pPr marL="1285875" indent="0">
+              <a:buNone/>
+              <a:defRPr sz="900">
                 <a:solidFill>
                   <a:schemeClr val="tx1">
                     <a:tint val="75000"/>
@@ -925,9 +932,9 @@
                 </a:solidFill>
               </a:defRPr>
             </a:lvl6pPr>
-            <a:lvl7pPr marL="2057400" indent="0">
-              <a:buNone/>
-              <a:defRPr sz="1200">
+            <a:lvl7pPr marL="1543050" indent="0">
+              <a:buNone/>
+              <a:defRPr sz="900">
                 <a:solidFill>
                   <a:schemeClr val="tx1">
                     <a:tint val="75000"/>
@@ -935,9 +942,9 @@
                 </a:solidFill>
               </a:defRPr>
             </a:lvl7pPr>
-            <a:lvl8pPr marL="2400300" indent="0">
-              <a:buNone/>
-              <a:defRPr sz="1200">
+            <a:lvl8pPr marL="1800225" indent="0">
+              <a:buNone/>
+              <a:defRPr sz="900">
                 <a:solidFill>
                   <a:schemeClr val="tx1">
                     <a:tint val="75000"/>
@@ -945,9 +952,9 @@
                 </a:solidFill>
               </a:defRPr>
             </a:lvl8pPr>
-            <a:lvl9pPr marL="2743200" indent="0">
-              <a:buNone/>
-              <a:defRPr sz="1200">
+            <a:lvl9pPr marL="2057400" indent="0">
+              <a:buNone/>
+              <a:defRPr sz="900">
                 <a:solidFill>
                   <a:schemeClr val="tx1">
                     <a:tint val="75000"/>
@@ -982,7 +989,7 @@
           <a:p>
             <a:fld id="{963322A3-F8A4-4C4A-B54B-91A1EA6C418E}" type="datetimeFigureOut">
               <a:rPr lang="en-US" smtClean="0"/>
-              <a:t>3/18/17</a:t>
+              <a:t>3/24/17</a:t>
             </a:fld>
             <a:endParaRPr lang="en-US"/>
           </a:p>
@@ -1074,7 +1081,7 @@
               <a:rPr lang="en-US" smtClean="0"/>
               <a:t>Click to edit Master title style</a:t>
             </a:r>
-            <a:endParaRPr lang="en-US" dirty="0"/>
+            <a:endParaRPr lang="en-US"/>
           </a:p>
         </p:txBody>
       </p:sp>
@@ -1131,7 +1138,7 @@
               <a:rPr lang="en-US" smtClean="0"/>
               <a:t>Fifth level</a:t>
             </a:r>
-            <a:endParaRPr lang="en-US" dirty="0"/>
+            <a:endParaRPr lang="en-US"/>
           </a:p>
         </p:txBody>
       </p:sp>
@@ -1188,7 +1195,7 @@
               <a:rPr lang="en-US" smtClean="0"/>
               <a:t>Fifth level</a:t>
             </a:r>
-            <a:endParaRPr lang="en-US" dirty="0"/>
+            <a:endParaRPr lang="en-US"/>
           </a:p>
         </p:txBody>
       </p:sp>
@@ -1209,7 +1216,7 @@
           <a:p>
             <a:fld id="{963322A3-F8A4-4C4A-B54B-91A1EA6C418E}" type="datetimeFigureOut">
               <a:rPr lang="en-US" smtClean="0"/>
-              <a:t>3/18/17</a:t>
+              <a:t>3/24/17</a:t>
             </a:fld>
             <a:endParaRPr lang="en-US"/>
           </a:p>
@@ -1294,7 +1301,7 @@
         </p:nvSpPr>
         <p:spPr>
           <a:xfrm>
-            <a:off x="472381" y="438152"/>
+            <a:off x="472381" y="438150"/>
             <a:ext cx="5915025" cy="1590676"/>
           </a:xfrm>
         </p:spPr>
@@ -1306,7 +1313,7 @@
               <a:rPr lang="en-US" smtClean="0"/>
               <a:t>Click to edit Master title style</a:t>
             </a:r>
-            <a:endParaRPr lang="en-US" dirty="0"/>
+            <a:endParaRPr lang="en-US"/>
           </a:p>
         </p:txBody>
       </p:sp>
@@ -1331,39 +1338,39 @@
           <a:lstStyle>
             <a:lvl1pPr marL="0" indent="0">
               <a:buNone/>
-              <a:defRPr sz="1800" b="1"/>
+              <a:defRPr sz="1350" b="1"/>
             </a:lvl1pPr>
-            <a:lvl2pPr marL="342900" indent="0">
-              <a:buNone/>
-              <a:defRPr sz="1500" b="1"/>
+            <a:lvl2pPr marL="257175" indent="0">
+              <a:buNone/>
+              <a:defRPr sz="1125" b="1"/>
             </a:lvl2pPr>
-            <a:lvl3pPr marL="685800" indent="0">
-              <a:buNone/>
-              <a:defRPr sz="1350" b="1"/>
+            <a:lvl3pPr marL="514350" indent="0">
+              <a:buNone/>
+              <a:defRPr sz="1013" b="1"/>
             </a:lvl3pPr>
-            <a:lvl4pPr marL="1028700" indent="0">
-              <a:buNone/>
-              <a:defRPr sz="1200" b="1"/>
+            <a:lvl4pPr marL="771525" indent="0">
+              <a:buNone/>
+              <a:defRPr sz="900" b="1"/>
             </a:lvl4pPr>
-            <a:lvl5pPr marL="1371600" indent="0">
-              <a:buNone/>
-              <a:defRPr sz="1200" b="1"/>
+            <a:lvl5pPr marL="1028700" indent="0">
+              <a:buNone/>
+              <a:defRPr sz="900" b="1"/>
             </a:lvl5pPr>
-            <a:lvl6pPr marL="1714500" indent="0">
-              <a:buNone/>
-              <a:defRPr sz="1200" b="1"/>
+            <a:lvl6pPr marL="1285875" indent="0">
+              <a:buNone/>
+              <a:defRPr sz="900" b="1"/>
             </a:lvl6pPr>
-            <a:lvl7pPr marL="2057400" indent="0">
-              <a:buNone/>
-              <a:defRPr sz="1200" b="1"/>
+            <a:lvl7pPr marL="1543050" indent="0">
+              <a:buNone/>
+              <a:defRPr sz="900" b="1"/>
             </a:lvl7pPr>
-            <a:lvl8pPr marL="2400300" indent="0">
-              <a:buNone/>
-              <a:defRPr sz="1200" b="1"/>
+            <a:lvl8pPr marL="1800225" indent="0">
+              <a:buNone/>
+              <a:defRPr sz="900" b="1"/>
             </a:lvl8pPr>
-            <a:lvl9pPr marL="2743200" indent="0">
-              <a:buNone/>
-              <a:defRPr sz="1200" b="1"/>
+            <a:lvl9pPr marL="2057400" indent="0">
+              <a:buNone/>
+              <a:defRPr sz="900" b="1"/>
             </a:lvl9pPr>
           </a:lstStyle>
           <a:p>
@@ -1428,7 +1435,7 @@
               <a:rPr lang="en-US" smtClean="0"/>
               <a:t>Fifth level</a:t>
             </a:r>
-            <a:endParaRPr lang="en-US" dirty="0"/>
+            <a:endParaRPr lang="en-US"/>
           </a:p>
         </p:txBody>
       </p:sp>
@@ -1453,39 +1460,39 @@
           <a:lstStyle>
             <a:lvl1pPr marL="0" indent="0">
               <a:buNone/>
-              <a:defRPr sz="1800" b="1"/>
+              <a:defRPr sz="1350" b="1"/>
             </a:lvl1pPr>
-            <a:lvl2pPr marL="342900" indent="0">
-              <a:buNone/>
-              <a:defRPr sz="1500" b="1"/>
+            <a:lvl2pPr marL="257175" indent="0">
+              <a:buNone/>
+              <a:defRPr sz="1125" b="1"/>
             </a:lvl2pPr>
-            <a:lvl3pPr marL="685800" indent="0">
-              <a:buNone/>
-              <a:defRPr sz="1350" b="1"/>
+            <a:lvl3pPr marL="514350" indent="0">
+              <a:buNone/>
+              <a:defRPr sz="1013" b="1"/>
             </a:lvl3pPr>
-            <a:lvl4pPr marL="1028700" indent="0">
-              <a:buNone/>
-              <a:defRPr sz="1200" b="1"/>
+            <a:lvl4pPr marL="771525" indent="0">
+              <a:buNone/>
+              <a:defRPr sz="900" b="1"/>
             </a:lvl4pPr>
-            <a:lvl5pPr marL="1371600" indent="0">
-              <a:buNone/>
-              <a:defRPr sz="1200" b="1"/>
+            <a:lvl5pPr marL="1028700" indent="0">
+              <a:buNone/>
+              <a:defRPr sz="900" b="1"/>
             </a:lvl5pPr>
-            <a:lvl6pPr marL="1714500" indent="0">
-              <a:buNone/>
-              <a:defRPr sz="1200" b="1"/>
+            <a:lvl6pPr marL="1285875" indent="0">
+              <a:buNone/>
+              <a:defRPr sz="900" b="1"/>
             </a:lvl6pPr>
-            <a:lvl7pPr marL="2057400" indent="0">
-              <a:buNone/>
-              <a:defRPr sz="1200" b="1"/>
+            <a:lvl7pPr marL="1543050" indent="0">
+              <a:buNone/>
+              <a:defRPr sz="900" b="1"/>
             </a:lvl7pPr>
-            <a:lvl8pPr marL="2400300" indent="0">
-              <a:buNone/>
-              <a:defRPr sz="1200" b="1"/>
+            <a:lvl8pPr marL="1800225" indent="0">
+              <a:buNone/>
+              <a:defRPr sz="900" b="1"/>
             </a:lvl8pPr>
-            <a:lvl9pPr marL="2743200" indent="0">
-              <a:buNone/>
-              <a:defRPr sz="1200" b="1"/>
+            <a:lvl9pPr marL="2057400" indent="0">
+              <a:buNone/>
+              <a:defRPr sz="900" b="1"/>
             </a:lvl9pPr>
           </a:lstStyle>
           <a:p>
@@ -1550,7 +1557,7 @@
               <a:rPr lang="en-US" smtClean="0"/>
               <a:t>Fifth level</a:t>
             </a:r>
-            <a:endParaRPr lang="en-US" dirty="0"/>
+            <a:endParaRPr lang="en-US"/>
           </a:p>
         </p:txBody>
       </p:sp>
@@ -1571,7 +1578,7 @@
           <a:p>
             <a:fld id="{963322A3-F8A4-4C4A-B54B-91A1EA6C418E}" type="datetimeFigureOut">
               <a:rPr lang="en-US" smtClean="0"/>
-              <a:t>3/18/17</a:t>
+              <a:t>3/24/17</a:t>
             </a:fld>
             <a:endParaRPr lang="en-US"/>
           </a:p>
@@ -1663,7 +1670,7 @@
               <a:rPr lang="en-US" smtClean="0"/>
               <a:t>Click to edit Master title style</a:t>
             </a:r>
-            <a:endParaRPr lang="en-US" dirty="0"/>
+            <a:endParaRPr lang="en-US"/>
           </a:p>
         </p:txBody>
       </p:sp>
@@ -1684,7 +1691,7 @@
           <a:p>
             <a:fld id="{963322A3-F8A4-4C4A-B54B-91A1EA6C418E}" type="datetimeFigureOut">
               <a:rPr lang="en-US" smtClean="0"/>
-              <a:t>3/18/17</a:t>
+              <a:t>3/24/17</a:t>
             </a:fld>
             <a:endParaRPr lang="en-US"/>
           </a:p>
@@ -1774,7 +1781,7 @@
           <a:p>
             <a:fld id="{963322A3-F8A4-4C4A-B54B-91A1EA6C418E}" type="datetimeFigureOut">
               <a:rPr lang="en-US" smtClean="0"/>
-              <a:t>3/18/17</a:t>
+              <a:t>3/24/17</a:t>
             </a:fld>
             <a:endParaRPr lang="en-US"/>
           </a:p>
@@ -1860,14 +1867,14 @@
         <p:spPr>
           <a:xfrm>
             <a:off x="472381" y="548640"/>
-            <a:ext cx="2211884" cy="1920240"/>
+            <a:ext cx="2211883" cy="1920240"/>
           </a:xfrm>
         </p:spPr>
         <p:txBody>
           <a:bodyPr anchor="b"/>
           <a:lstStyle>
             <a:lvl1pPr>
-              <a:defRPr sz="2400"/>
+              <a:defRPr sz="1800"/>
             </a:lvl1pPr>
           </a:lstStyle>
           <a:p>
@@ -1875,7 +1882,7 @@
               <a:rPr lang="en-US" smtClean="0"/>
               <a:t>Click to edit Master title style</a:t>
             </a:r>
-            <a:endParaRPr lang="en-US" dirty="0"/>
+            <a:endParaRPr lang="en-US"/>
           </a:p>
         </p:txBody>
       </p:sp>
@@ -1891,7 +1898,7 @@
         </p:nvSpPr>
         <p:spPr>
           <a:xfrm>
-            <a:off x="2915543" y="1184912"/>
+            <a:off x="2915543" y="1184911"/>
             <a:ext cx="3471863" cy="5848350"/>
           </a:xfrm>
         </p:spPr>
@@ -1899,31 +1906,31 @@
           <a:bodyPr/>
           <a:lstStyle>
             <a:lvl1pPr>
-              <a:defRPr sz="2400"/>
+              <a:defRPr sz="1800"/>
             </a:lvl1pPr>
             <a:lvl2pPr>
-              <a:defRPr sz="2100"/>
+              <a:defRPr sz="1575"/>
             </a:lvl2pPr>
             <a:lvl3pPr>
-              <a:defRPr sz="1800"/>
+              <a:defRPr sz="1350"/>
             </a:lvl3pPr>
             <a:lvl4pPr>
-              <a:defRPr sz="1500"/>
+              <a:defRPr sz="1125"/>
             </a:lvl4pPr>
             <a:lvl5pPr>
-              <a:defRPr sz="1500"/>
+              <a:defRPr sz="1125"/>
             </a:lvl5pPr>
             <a:lvl6pPr>
-              <a:defRPr sz="1500"/>
+              <a:defRPr sz="1125"/>
             </a:lvl6pPr>
             <a:lvl7pPr>
-              <a:defRPr sz="1500"/>
+              <a:defRPr sz="1125"/>
             </a:lvl7pPr>
             <a:lvl8pPr>
-              <a:defRPr sz="1500"/>
+              <a:defRPr sz="1125"/>
             </a:lvl8pPr>
             <a:lvl9pPr>
-              <a:defRPr sz="1500"/>
+              <a:defRPr sz="1125"/>
             </a:lvl9pPr>
           </a:lstStyle>
           <a:p>
@@ -1960,7 +1967,7 @@
               <a:rPr lang="en-US" smtClean="0"/>
               <a:t>Fifth level</a:t>
             </a:r>
-            <a:endParaRPr lang="en-US" dirty="0"/>
+            <a:endParaRPr lang="en-US"/>
           </a:p>
         </p:txBody>
       </p:sp>
@@ -1977,7 +1984,7 @@
         <p:spPr>
           <a:xfrm>
             <a:off x="472381" y="2468880"/>
-            <a:ext cx="2211884" cy="4573906"/>
+            <a:ext cx="2211883" cy="4573906"/>
           </a:xfrm>
         </p:spPr>
         <p:txBody>
@@ -1985,39 +1992,39 @@
           <a:lstStyle>
             <a:lvl1pPr marL="0" indent="0">
               <a:buNone/>
-              <a:defRPr sz="1200"/>
+              <a:defRPr sz="900"/>
             </a:lvl1pPr>
-            <a:lvl2pPr marL="342900" indent="0">
-              <a:buNone/>
-              <a:defRPr sz="1050"/>
+            <a:lvl2pPr marL="257175" indent="0">
+              <a:buNone/>
+              <a:defRPr sz="788"/>
             </a:lvl2pPr>
-            <a:lvl3pPr marL="685800" indent="0">
-              <a:buNone/>
-              <a:defRPr sz="900"/>
+            <a:lvl3pPr marL="514350" indent="0">
+              <a:buNone/>
+              <a:defRPr sz="675"/>
             </a:lvl3pPr>
-            <a:lvl4pPr marL="1028700" indent="0">
-              <a:buNone/>
-              <a:defRPr sz="750"/>
+            <a:lvl4pPr marL="771525" indent="0">
+              <a:buNone/>
+              <a:defRPr sz="563"/>
             </a:lvl4pPr>
-            <a:lvl5pPr marL="1371600" indent="0">
-              <a:buNone/>
-              <a:defRPr sz="750"/>
+            <a:lvl5pPr marL="1028700" indent="0">
+              <a:buNone/>
+              <a:defRPr sz="563"/>
             </a:lvl5pPr>
-            <a:lvl6pPr marL="1714500" indent="0">
-              <a:buNone/>
-              <a:defRPr sz="750"/>
+            <a:lvl6pPr marL="1285875" indent="0">
+              <a:buNone/>
+              <a:defRPr sz="563"/>
             </a:lvl6pPr>
-            <a:lvl7pPr marL="2057400" indent="0">
-              <a:buNone/>
-              <a:defRPr sz="750"/>
+            <a:lvl7pPr marL="1543050" indent="0">
+              <a:buNone/>
+              <a:defRPr sz="563"/>
             </a:lvl7pPr>
-            <a:lvl8pPr marL="2400300" indent="0">
-              <a:buNone/>
-              <a:defRPr sz="750"/>
+            <a:lvl8pPr marL="1800225" indent="0">
+              <a:buNone/>
+              <a:defRPr sz="563"/>
             </a:lvl8pPr>
-            <a:lvl9pPr marL="2743200" indent="0">
-              <a:buNone/>
-              <a:defRPr sz="750"/>
+            <a:lvl9pPr marL="2057400" indent="0">
+              <a:buNone/>
+              <a:defRPr sz="563"/>
             </a:lvl9pPr>
           </a:lstStyle>
           <a:p>
@@ -2046,7 +2053,7 @@
           <a:p>
             <a:fld id="{963322A3-F8A4-4C4A-B54B-91A1EA6C418E}" type="datetimeFigureOut">
               <a:rPr lang="en-US" smtClean="0"/>
-              <a:t>3/18/17</a:t>
+              <a:t>3/24/17</a:t>
             </a:fld>
             <a:endParaRPr lang="en-US"/>
           </a:p>
@@ -2132,14 +2139,14 @@
         <p:spPr>
           <a:xfrm>
             <a:off x="472381" y="548640"/>
-            <a:ext cx="2211884" cy="1920240"/>
+            <a:ext cx="2211883" cy="1920240"/>
           </a:xfrm>
         </p:spPr>
         <p:txBody>
           <a:bodyPr anchor="b"/>
           <a:lstStyle>
             <a:lvl1pPr>
-              <a:defRPr sz="2400"/>
+              <a:defRPr sz="1800"/>
             </a:lvl1pPr>
           </a:lstStyle>
           <a:p>
@@ -2147,7 +2154,7 @@
               <a:rPr lang="en-US" smtClean="0"/>
               <a:t>Click to edit Master title style</a:t>
             </a:r>
-            <a:endParaRPr lang="en-US" dirty="0"/>
+            <a:endParaRPr lang="en-US"/>
           </a:p>
         </p:txBody>
       </p:sp>
@@ -2155,7 +2162,7 @@
         <p:nvSpPr>
           <p:cNvPr id="3" name="Picture Placeholder 2"/>
           <p:cNvSpPr>
-            <a:spLocks noGrp="1" noChangeAspect="1"/>
+            <a:spLocks noGrp="1"/>
           </p:cNvSpPr>
           <p:nvPr>
             <p:ph type="pic" idx="1"/>
@@ -2163,56 +2170,52 @@
         </p:nvSpPr>
         <p:spPr>
           <a:xfrm>
-            <a:off x="2915543" y="1184912"/>
+            <a:off x="2915543" y="1184911"/>
             <a:ext cx="3471863" cy="5848350"/>
           </a:xfrm>
         </p:spPr>
         <p:txBody>
-          <a:bodyPr anchor="t"/>
+          <a:bodyPr/>
           <a:lstStyle>
             <a:lvl1pPr marL="0" indent="0">
               <a:buNone/>
-              <a:defRPr sz="2400"/>
+              <a:defRPr sz="1800"/>
             </a:lvl1pPr>
-            <a:lvl2pPr marL="342900" indent="0">
-              <a:buNone/>
-              <a:defRPr sz="2100"/>
+            <a:lvl2pPr marL="257175" indent="0">
+              <a:buNone/>
+              <a:defRPr sz="1575"/>
             </a:lvl2pPr>
-            <a:lvl3pPr marL="685800" indent="0">
-              <a:buNone/>
-              <a:defRPr sz="1800"/>
+            <a:lvl3pPr marL="514350" indent="0">
+              <a:buNone/>
+              <a:defRPr sz="1350"/>
             </a:lvl3pPr>
-            <a:lvl4pPr marL="1028700" indent="0">
-              <a:buNone/>
-              <a:defRPr sz="1500"/>
+            <a:lvl4pPr marL="771525" indent="0">
+              <a:buNone/>
+              <a:defRPr sz="1125"/>
             </a:lvl4pPr>
-            <a:lvl5pPr marL="1371600" indent="0">
-              <a:buNone/>
-              <a:defRPr sz="1500"/>
+            <a:lvl5pPr marL="1028700" indent="0">
+              <a:buNone/>
+              <a:defRPr sz="1125"/>
             </a:lvl5pPr>
-            <a:lvl6pPr marL="1714500" indent="0">
-              <a:buNone/>
-              <a:defRPr sz="1500"/>
+            <a:lvl6pPr marL="1285875" indent="0">
+              <a:buNone/>
+              <a:defRPr sz="1125"/>
             </a:lvl6pPr>
-            <a:lvl7pPr marL="2057400" indent="0">
-              <a:buNone/>
-              <a:defRPr sz="1500"/>
+            <a:lvl7pPr marL="1543050" indent="0">
+              <a:buNone/>
+              <a:defRPr sz="1125"/>
             </a:lvl7pPr>
-            <a:lvl8pPr marL="2400300" indent="0">
-              <a:buNone/>
-              <a:defRPr sz="1500"/>
+            <a:lvl8pPr marL="1800225" indent="0">
+              <a:buNone/>
+              <a:defRPr sz="1125"/>
             </a:lvl8pPr>
-            <a:lvl9pPr marL="2743200" indent="0">
-              <a:buNone/>
-              <a:defRPr sz="1500"/>
+            <a:lvl9pPr marL="2057400" indent="0">
+              <a:buNone/>
+              <a:defRPr sz="1125"/>
             </a:lvl9pPr>
           </a:lstStyle>
           <a:p>
-            <a:r>
-              <a:rPr lang="en-US" smtClean="0"/>
-              <a:t>Drag picture to placeholder or click icon to add</a:t>
-            </a:r>
-            <a:endParaRPr lang="en-US" dirty="0"/>
+            <a:endParaRPr lang="en-US"/>
           </a:p>
         </p:txBody>
       </p:sp>
@@ -2229,7 +2232,7 @@
         <p:spPr>
           <a:xfrm>
             <a:off x="472381" y="2468880"/>
-            <a:ext cx="2211884" cy="4573906"/>
+            <a:ext cx="2211883" cy="4573906"/>
           </a:xfrm>
         </p:spPr>
         <p:txBody>
@@ -2237,39 +2240,39 @@
           <a:lstStyle>
             <a:lvl1pPr marL="0" indent="0">
               <a:buNone/>
-              <a:defRPr sz="1200"/>
+              <a:defRPr sz="900"/>
             </a:lvl1pPr>
-            <a:lvl2pPr marL="342900" indent="0">
-              <a:buNone/>
-              <a:defRPr sz="1050"/>
+            <a:lvl2pPr marL="257175" indent="0">
+              <a:buNone/>
+              <a:defRPr sz="788"/>
             </a:lvl2pPr>
-            <a:lvl3pPr marL="685800" indent="0">
-              <a:buNone/>
-              <a:defRPr sz="900"/>
+            <a:lvl3pPr marL="514350" indent="0">
+              <a:buNone/>
+              <a:defRPr sz="675"/>
             </a:lvl3pPr>
-            <a:lvl4pPr marL="1028700" indent="0">
-              <a:buNone/>
-              <a:defRPr sz="750"/>
+            <a:lvl4pPr marL="771525" indent="0">
+              <a:buNone/>
+              <a:defRPr sz="563"/>
             </a:lvl4pPr>
-            <a:lvl5pPr marL="1371600" indent="0">
-              <a:buNone/>
-              <a:defRPr sz="750"/>
+            <a:lvl5pPr marL="1028700" indent="0">
+              <a:buNone/>
+              <a:defRPr sz="563"/>
             </a:lvl5pPr>
-            <a:lvl6pPr marL="1714500" indent="0">
-              <a:buNone/>
-              <a:defRPr sz="750"/>
+            <a:lvl6pPr marL="1285875" indent="0">
+              <a:buNone/>
+              <a:defRPr sz="563"/>
             </a:lvl6pPr>
-            <a:lvl7pPr marL="2057400" indent="0">
-              <a:buNone/>
-              <a:defRPr sz="750"/>
+            <a:lvl7pPr marL="1543050" indent="0">
+              <a:buNone/>
+              <a:defRPr sz="563"/>
             </a:lvl7pPr>
-            <a:lvl8pPr marL="2400300" indent="0">
-              <a:buNone/>
-              <a:defRPr sz="750"/>
+            <a:lvl8pPr marL="1800225" indent="0">
+              <a:buNone/>
+              <a:defRPr sz="563"/>
             </a:lvl8pPr>
-            <a:lvl9pPr marL="2743200" indent="0">
-              <a:buNone/>
-              <a:defRPr sz="750"/>
+            <a:lvl9pPr marL="2057400" indent="0">
+              <a:buNone/>
+              <a:defRPr sz="563"/>
             </a:lvl9pPr>
           </a:lstStyle>
           <a:p>
@@ -2298,7 +2301,7 @@
           <a:p>
             <a:fld id="{963322A3-F8A4-4C4A-B54B-91A1EA6C418E}" type="datetimeFigureOut">
               <a:rPr lang="en-US" smtClean="0"/>
-              <a:t>3/18/17</a:t>
+              <a:t>3/24/17</a:t>
             </a:fld>
             <a:endParaRPr lang="en-US"/>
           </a:p>
@@ -2388,7 +2391,7 @@
         </p:nvSpPr>
         <p:spPr>
           <a:xfrm>
-            <a:off x="471488" y="438152"/>
+            <a:off x="471488" y="438150"/>
             <a:ext cx="5915025" cy="1590676"/>
           </a:xfrm>
           <a:prstGeom prst="rect">
@@ -2405,7 +2408,7 @@
               <a:rPr lang="en-US" smtClean="0"/>
               <a:t>Click to edit Master title style</a:t>
             </a:r>
-            <a:endParaRPr lang="en-US" dirty="0"/>
+            <a:endParaRPr lang="en-US"/>
           </a:p>
         </p:txBody>
       </p:sp>
@@ -2467,7 +2470,7 @@
               <a:rPr lang="en-US" smtClean="0"/>
               <a:t>Fifth level</a:t>
             </a:r>
-            <a:endParaRPr lang="en-US" dirty="0"/>
+            <a:endParaRPr lang="en-US"/>
           </a:p>
         </p:txBody>
       </p:sp>
@@ -2483,7 +2486,7 @@
         </p:nvSpPr>
         <p:spPr>
           <a:xfrm>
-            <a:off x="471488" y="7627622"/>
+            <a:off x="471488" y="7627621"/>
             <a:ext cx="1543050" cy="438150"/>
           </a:xfrm>
           <a:prstGeom prst="rect">
@@ -2494,7 +2497,7 @@
           <a:bodyPr vert="horz" lIns="91440" tIns="45720" rIns="91440" bIns="45720" rtlCol="0" anchor="ctr"/>
           <a:lstStyle>
             <a:lvl1pPr algn="l">
-              <a:defRPr sz="900">
+              <a:defRPr sz="675">
                 <a:solidFill>
                   <a:schemeClr val="tx1">
                     <a:tint val="75000"/>
@@ -2506,7 +2509,7 @@
           <a:p>
             <a:fld id="{963322A3-F8A4-4C4A-B54B-91A1EA6C418E}" type="datetimeFigureOut">
               <a:rPr lang="en-US" smtClean="0"/>
-              <a:t>3/18/17</a:t>
+              <a:t>3/24/17</a:t>
             </a:fld>
             <a:endParaRPr lang="en-US"/>
           </a:p>
@@ -2524,7 +2527,7 @@
         </p:nvSpPr>
         <p:spPr>
           <a:xfrm>
-            <a:off x="2271713" y="7627622"/>
+            <a:off x="2271713" y="7627621"/>
             <a:ext cx="2314575" cy="438150"/>
           </a:xfrm>
           <a:prstGeom prst="rect">
@@ -2535,7 +2538,7 @@
           <a:bodyPr vert="horz" lIns="91440" tIns="45720" rIns="91440" bIns="45720" rtlCol="0" anchor="ctr"/>
           <a:lstStyle>
             <a:lvl1pPr algn="ctr">
-              <a:defRPr sz="900">
+              <a:defRPr sz="675">
                 <a:solidFill>
                   <a:schemeClr val="tx1">
                     <a:tint val="75000"/>
@@ -2561,7 +2564,7 @@
         </p:nvSpPr>
         <p:spPr>
           <a:xfrm>
-            <a:off x="4843463" y="7627622"/>
+            <a:off x="4843463" y="7627621"/>
             <a:ext cx="1543050" cy="438150"/>
           </a:xfrm>
           <a:prstGeom prst="rect">
@@ -2572,7 +2575,7 @@
           <a:bodyPr vert="horz" lIns="91440" tIns="45720" rIns="91440" bIns="45720" rtlCol="0" anchor="ctr"/>
           <a:lstStyle>
             <a:lvl1pPr algn="r">
-              <a:defRPr sz="900">
+              <a:defRPr sz="675">
                 <a:solidFill>
                   <a:schemeClr val="tx1">
                     <a:tint val="75000"/>
@@ -2593,27 +2596,27 @@
     </p:spTree>
     <p:extLst>
       <p:ext uri="{BB962C8B-B14F-4D97-AF65-F5344CB8AC3E}">
-        <p14:creationId xmlns:p14="http://schemas.microsoft.com/office/powerpoint/2010/main" val="91641811"/>
+        <p14:creationId xmlns:p14="http://schemas.microsoft.com/office/powerpoint/2010/main" val="1302664674"/>
       </p:ext>
     </p:extLst>
   </p:cSld>
   <p:clrMap bg1="lt1" tx1="dk1" bg2="lt2" tx2="dk2" accent1="accent1" accent2="accent2" accent3="accent3" accent4="accent4" accent5="accent5" accent6="accent6" hlink="hlink" folHlink="folHlink"/>
   <p:sldLayoutIdLst>
-    <p:sldLayoutId id="2147483685" r:id="rId1"/>
-    <p:sldLayoutId id="2147483686" r:id="rId2"/>
-    <p:sldLayoutId id="2147483687" r:id="rId3"/>
-    <p:sldLayoutId id="2147483688" r:id="rId4"/>
-    <p:sldLayoutId id="2147483689" r:id="rId5"/>
-    <p:sldLayoutId id="2147483690" r:id="rId6"/>
-    <p:sldLayoutId id="2147483691" r:id="rId7"/>
-    <p:sldLayoutId id="2147483692" r:id="rId8"/>
-    <p:sldLayoutId id="2147483693" r:id="rId9"/>
-    <p:sldLayoutId id="2147483694" r:id="rId10"/>
-    <p:sldLayoutId id="2147483695" r:id="rId11"/>
+    <p:sldLayoutId id="2147483781" r:id="rId1"/>
+    <p:sldLayoutId id="2147483782" r:id="rId2"/>
+    <p:sldLayoutId id="2147483783" r:id="rId3"/>
+    <p:sldLayoutId id="2147483784" r:id="rId4"/>
+    <p:sldLayoutId id="2147483785" r:id="rId5"/>
+    <p:sldLayoutId id="2147483786" r:id="rId6"/>
+    <p:sldLayoutId id="2147483787" r:id="rId7"/>
+    <p:sldLayoutId id="2147483788" r:id="rId8"/>
+    <p:sldLayoutId id="2147483789" r:id="rId9"/>
+    <p:sldLayoutId id="2147483790" r:id="rId10"/>
+    <p:sldLayoutId id="2147483791" r:id="rId11"/>
   </p:sldLayoutIdLst>
   <p:txStyles>
     <p:titleStyle>
-      <a:lvl1pPr algn="l" defTabSz="685800" rtl="0" eaLnBrk="1" latinLnBrk="0" hangingPunct="1">
+      <a:lvl1pPr algn="l" defTabSz="514350" rtl="0" eaLnBrk="1" latinLnBrk="0" hangingPunct="1">
         <a:lnSpc>
           <a:spcPct val="90000"/>
         </a:lnSpc>
@@ -2621,7 +2624,7 @@
           <a:spcPct val="0"/>
         </a:spcBef>
         <a:buNone/>
-        <a:defRPr sz="3300" kern="1200">
+        <a:defRPr sz="2475" kern="1200">
           <a:solidFill>
             <a:schemeClr val="tx1"/>
           </a:solidFill>
@@ -2632,16 +2635,16 @@
       </a:lvl1pPr>
     </p:titleStyle>
     <p:bodyStyle>
-      <a:lvl1pPr marL="171450" indent="-171450" algn="l" defTabSz="685800" rtl="0" eaLnBrk="1" latinLnBrk="0" hangingPunct="1">
+      <a:lvl1pPr marL="128588" indent="-128588" algn="l" defTabSz="514350" rtl="0" eaLnBrk="1" latinLnBrk="0" hangingPunct="1">
         <a:lnSpc>
           <a:spcPct val="90000"/>
         </a:lnSpc>
         <a:spcBef>
-          <a:spcPts val="750"/>
+          <a:spcPts val="563"/>
         </a:spcBef>
-        <a:buFont typeface="Arial" panose="020B0604020202020204" pitchFamily="34" charset="0"/>
+        <a:buFont typeface="Arial"/>
         <a:buChar char="•"/>
-        <a:defRPr sz="2100" kern="1200">
+        <a:defRPr sz="1575" kern="1200">
           <a:solidFill>
             <a:schemeClr val="tx1"/>
           </a:solidFill>
@@ -2650,50 +2653,14 @@
           <a:cs typeface="+mn-cs"/>
         </a:defRPr>
       </a:lvl1pPr>
-      <a:lvl2pPr marL="514350" indent="-171450" algn="l" defTabSz="685800" rtl="0" eaLnBrk="1" latinLnBrk="0" hangingPunct="1">
+      <a:lvl2pPr marL="385763" indent="-128588" algn="l" defTabSz="514350" rtl="0" eaLnBrk="1" latinLnBrk="0" hangingPunct="1">
         <a:lnSpc>
           <a:spcPct val="90000"/>
         </a:lnSpc>
         <a:spcBef>
-          <a:spcPts val="375"/>
+          <a:spcPts val="281"/>
         </a:spcBef>
-        <a:buFont typeface="Arial" panose="020B0604020202020204" pitchFamily="34" charset="0"/>
-        <a:buChar char="•"/>
-        <a:defRPr sz="1800" kern="1200">
-          <a:solidFill>
-            <a:schemeClr val="tx1"/>
-          </a:solidFill>
-          <a:latin typeface="+mn-lt"/>
-          <a:ea typeface="+mn-ea"/>
-          <a:cs typeface="+mn-cs"/>
-        </a:defRPr>
-      </a:lvl2pPr>
-      <a:lvl3pPr marL="857250" indent="-171450" algn="l" defTabSz="685800" rtl="0" eaLnBrk="1" latinLnBrk="0" hangingPunct="1">
-        <a:lnSpc>
-          <a:spcPct val="90000"/>
-        </a:lnSpc>
-        <a:spcBef>
-          <a:spcPts val="375"/>
-        </a:spcBef>
-        <a:buFont typeface="Arial" panose="020B0604020202020204" pitchFamily="34" charset="0"/>
-        <a:buChar char="•"/>
-        <a:defRPr sz="1500" kern="1200">
-          <a:solidFill>
-            <a:schemeClr val="tx1"/>
-          </a:solidFill>
-          <a:latin typeface="+mn-lt"/>
-          <a:ea typeface="+mn-ea"/>
-          <a:cs typeface="+mn-cs"/>
-        </a:defRPr>
-      </a:lvl3pPr>
-      <a:lvl4pPr marL="1200150" indent="-171450" algn="l" defTabSz="685800" rtl="0" eaLnBrk="1" latinLnBrk="0" hangingPunct="1">
-        <a:lnSpc>
-          <a:spcPct val="90000"/>
-        </a:lnSpc>
-        <a:spcBef>
-          <a:spcPts val="375"/>
-        </a:spcBef>
-        <a:buFont typeface="Arial" panose="020B0604020202020204" pitchFamily="34" charset="0"/>
+        <a:buFont typeface="Arial"/>
         <a:buChar char="•"/>
         <a:defRPr sz="1350" kern="1200">
           <a:solidFill>
@@ -2703,17 +2670,53 @@
           <a:ea typeface="+mn-ea"/>
           <a:cs typeface="+mn-cs"/>
         </a:defRPr>
-      </a:lvl4pPr>
-      <a:lvl5pPr marL="1543050" indent="-171450" algn="l" defTabSz="685800" rtl="0" eaLnBrk="1" latinLnBrk="0" hangingPunct="1">
+      </a:lvl2pPr>
+      <a:lvl3pPr marL="642938" indent="-128588" algn="l" defTabSz="514350" rtl="0" eaLnBrk="1" latinLnBrk="0" hangingPunct="1">
         <a:lnSpc>
           <a:spcPct val="90000"/>
         </a:lnSpc>
         <a:spcBef>
-          <a:spcPts val="375"/>
+          <a:spcPts val="281"/>
         </a:spcBef>
-        <a:buFont typeface="Arial" panose="020B0604020202020204" pitchFamily="34" charset="0"/>
+        <a:buFont typeface="Arial"/>
         <a:buChar char="•"/>
-        <a:defRPr sz="1350" kern="1200">
+        <a:defRPr sz="1125" kern="1200">
+          <a:solidFill>
+            <a:schemeClr val="tx1"/>
+          </a:solidFill>
+          <a:latin typeface="+mn-lt"/>
+          <a:ea typeface="+mn-ea"/>
+          <a:cs typeface="+mn-cs"/>
+        </a:defRPr>
+      </a:lvl3pPr>
+      <a:lvl4pPr marL="900113" indent="-128588" algn="l" defTabSz="514350" rtl="0" eaLnBrk="1" latinLnBrk="0" hangingPunct="1">
+        <a:lnSpc>
+          <a:spcPct val="90000"/>
+        </a:lnSpc>
+        <a:spcBef>
+          <a:spcPts val="281"/>
+        </a:spcBef>
+        <a:buFont typeface="Arial"/>
+        <a:buChar char="•"/>
+        <a:defRPr sz="1013" kern="1200">
+          <a:solidFill>
+            <a:schemeClr val="tx1"/>
+          </a:solidFill>
+          <a:latin typeface="+mn-lt"/>
+          <a:ea typeface="+mn-ea"/>
+          <a:cs typeface="+mn-cs"/>
+        </a:defRPr>
+      </a:lvl4pPr>
+      <a:lvl5pPr marL="1157288" indent="-128588" algn="l" defTabSz="514350" rtl="0" eaLnBrk="1" latinLnBrk="0" hangingPunct="1">
+        <a:lnSpc>
+          <a:spcPct val="90000"/>
+        </a:lnSpc>
+        <a:spcBef>
+          <a:spcPts val="281"/>
+        </a:spcBef>
+        <a:buFont typeface="Arial"/>
+        <a:buChar char="•"/>
+        <a:defRPr sz="1013" kern="1200">
           <a:solidFill>
             <a:schemeClr val="tx1"/>
           </a:solidFill>
@@ -2722,16 +2725,16 @@
           <a:cs typeface="+mn-cs"/>
         </a:defRPr>
       </a:lvl5pPr>
-      <a:lvl6pPr marL="1885950" indent="-171450" algn="l" defTabSz="685800" rtl="0" eaLnBrk="1" latinLnBrk="0" hangingPunct="1">
+      <a:lvl6pPr marL="1414463" indent="-128588" algn="l" defTabSz="514350" rtl="0" eaLnBrk="1" latinLnBrk="0" hangingPunct="1">
         <a:lnSpc>
           <a:spcPct val="90000"/>
         </a:lnSpc>
         <a:spcBef>
-          <a:spcPts val="375"/>
+          <a:spcPts val="281"/>
         </a:spcBef>
-        <a:buFont typeface="Arial" panose="020B0604020202020204" pitchFamily="34" charset="0"/>
+        <a:buFont typeface="Arial"/>
         <a:buChar char="•"/>
-        <a:defRPr sz="1350" kern="1200">
+        <a:defRPr sz="1013" kern="1200">
           <a:solidFill>
             <a:schemeClr val="tx1"/>
           </a:solidFill>
@@ -2740,16 +2743,16 @@
           <a:cs typeface="+mn-cs"/>
         </a:defRPr>
       </a:lvl6pPr>
-      <a:lvl7pPr marL="2228850" indent="-171450" algn="l" defTabSz="685800" rtl="0" eaLnBrk="1" latinLnBrk="0" hangingPunct="1">
+      <a:lvl7pPr marL="1671638" indent="-128588" algn="l" defTabSz="514350" rtl="0" eaLnBrk="1" latinLnBrk="0" hangingPunct="1">
         <a:lnSpc>
           <a:spcPct val="90000"/>
         </a:lnSpc>
         <a:spcBef>
-          <a:spcPts val="375"/>
+          <a:spcPts val="281"/>
         </a:spcBef>
-        <a:buFont typeface="Arial" panose="020B0604020202020204" pitchFamily="34" charset="0"/>
+        <a:buFont typeface="Arial"/>
         <a:buChar char="•"/>
-        <a:defRPr sz="1350" kern="1200">
+        <a:defRPr sz="1013" kern="1200">
           <a:solidFill>
             <a:schemeClr val="tx1"/>
           </a:solidFill>
@@ -2758,16 +2761,16 @@
           <a:cs typeface="+mn-cs"/>
         </a:defRPr>
       </a:lvl7pPr>
-      <a:lvl8pPr marL="2571750" indent="-171450" algn="l" defTabSz="685800" rtl="0" eaLnBrk="1" latinLnBrk="0" hangingPunct="1">
+      <a:lvl8pPr marL="1928813" indent="-128588" algn="l" defTabSz="514350" rtl="0" eaLnBrk="1" latinLnBrk="0" hangingPunct="1">
         <a:lnSpc>
           <a:spcPct val="90000"/>
         </a:lnSpc>
         <a:spcBef>
-          <a:spcPts val="375"/>
+          <a:spcPts val="281"/>
         </a:spcBef>
-        <a:buFont typeface="Arial" panose="020B0604020202020204" pitchFamily="34" charset="0"/>
+        <a:buFont typeface="Arial"/>
         <a:buChar char="•"/>
-        <a:defRPr sz="1350" kern="1200">
+        <a:defRPr sz="1013" kern="1200">
           <a:solidFill>
             <a:schemeClr val="tx1"/>
           </a:solidFill>
@@ -2776,16 +2779,16 @@
           <a:cs typeface="+mn-cs"/>
         </a:defRPr>
       </a:lvl8pPr>
-      <a:lvl9pPr marL="2914650" indent="-171450" algn="l" defTabSz="685800" rtl="0" eaLnBrk="1" latinLnBrk="0" hangingPunct="1">
+      <a:lvl9pPr marL="2185988" indent="-128588" algn="l" defTabSz="514350" rtl="0" eaLnBrk="1" latinLnBrk="0" hangingPunct="1">
         <a:lnSpc>
           <a:spcPct val="90000"/>
         </a:lnSpc>
         <a:spcBef>
-          <a:spcPts val="375"/>
+          <a:spcPts val="281"/>
         </a:spcBef>
-        <a:buFont typeface="Arial" panose="020B0604020202020204" pitchFamily="34" charset="0"/>
+        <a:buFont typeface="Arial"/>
         <a:buChar char="•"/>
-        <a:defRPr sz="1350" kern="1200">
+        <a:defRPr sz="1013" kern="1200">
           <a:solidFill>
             <a:schemeClr val="tx1"/>
           </a:solidFill>
@@ -2799,8 +2802,8 @@
       <a:defPPr>
         <a:defRPr lang="en-US"/>
       </a:defPPr>
-      <a:lvl1pPr marL="0" algn="l" defTabSz="685800" rtl="0" eaLnBrk="1" latinLnBrk="0" hangingPunct="1">
-        <a:defRPr sz="1350" kern="1200">
+      <a:lvl1pPr marL="0" algn="l" defTabSz="514350" rtl="0" eaLnBrk="1" latinLnBrk="0" hangingPunct="1">
+        <a:defRPr sz="1013" kern="1200">
           <a:solidFill>
             <a:schemeClr val="tx1"/>
           </a:solidFill>
@@ -2809,8 +2812,8 @@
           <a:cs typeface="+mn-cs"/>
         </a:defRPr>
       </a:lvl1pPr>
-      <a:lvl2pPr marL="342900" algn="l" defTabSz="685800" rtl="0" eaLnBrk="1" latinLnBrk="0" hangingPunct="1">
-        <a:defRPr sz="1350" kern="1200">
+      <a:lvl2pPr marL="257175" algn="l" defTabSz="514350" rtl="0" eaLnBrk="1" latinLnBrk="0" hangingPunct="1">
+        <a:defRPr sz="1013" kern="1200">
           <a:solidFill>
             <a:schemeClr val="tx1"/>
           </a:solidFill>
@@ -2819,8 +2822,8 @@
           <a:cs typeface="+mn-cs"/>
         </a:defRPr>
       </a:lvl2pPr>
-      <a:lvl3pPr marL="685800" algn="l" defTabSz="685800" rtl="0" eaLnBrk="1" latinLnBrk="0" hangingPunct="1">
-        <a:defRPr sz="1350" kern="1200">
+      <a:lvl3pPr marL="514350" algn="l" defTabSz="514350" rtl="0" eaLnBrk="1" latinLnBrk="0" hangingPunct="1">
+        <a:defRPr sz="1013" kern="1200">
           <a:solidFill>
             <a:schemeClr val="tx1"/>
           </a:solidFill>
@@ -2829,8 +2832,8 @@
           <a:cs typeface="+mn-cs"/>
         </a:defRPr>
       </a:lvl3pPr>
-      <a:lvl4pPr marL="1028700" algn="l" defTabSz="685800" rtl="0" eaLnBrk="1" latinLnBrk="0" hangingPunct="1">
-        <a:defRPr sz="1350" kern="1200">
+      <a:lvl4pPr marL="771525" algn="l" defTabSz="514350" rtl="0" eaLnBrk="1" latinLnBrk="0" hangingPunct="1">
+        <a:defRPr sz="1013" kern="1200">
           <a:solidFill>
             <a:schemeClr val="tx1"/>
           </a:solidFill>
@@ -2839,8 +2842,8 @@
           <a:cs typeface="+mn-cs"/>
         </a:defRPr>
       </a:lvl4pPr>
-      <a:lvl5pPr marL="1371600" algn="l" defTabSz="685800" rtl="0" eaLnBrk="1" latinLnBrk="0" hangingPunct="1">
-        <a:defRPr sz="1350" kern="1200">
+      <a:lvl5pPr marL="1028700" algn="l" defTabSz="514350" rtl="0" eaLnBrk="1" latinLnBrk="0" hangingPunct="1">
+        <a:defRPr sz="1013" kern="1200">
           <a:solidFill>
             <a:schemeClr val="tx1"/>
           </a:solidFill>
@@ -2849,8 +2852,8 @@
           <a:cs typeface="+mn-cs"/>
         </a:defRPr>
       </a:lvl5pPr>
-      <a:lvl6pPr marL="1714500" algn="l" defTabSz="685800" rtl="0" eaLnBrk="1" latinLnBrk="0" hangingPunct="1">
-        <a:defRPr sz="1350" kern="1200">
+      <a:lvl6pPr marL="1285875" algn="l" defTabSz="514350" rtl="0" eaLnBrk="1" latinLnBrk="0" hangingPunct="1">
+        <a:defRPr sz="1013" kern="1200">
           <a:solidFill>
             <a:schemeClr val="tx1"/>
           </a:solidFill>
@@ -2859,8 +2862,8 @@
           <a:cs typeface="+mn-cs"/>
         </a:defRPr>
       </a:lvl6pPr>
-      <a:lvl7pPr marL="2057400" algn="l" defTabSz="685800" rtl="0" eaLnBrk="1" latinLnBrk="0" hangingPunct="1">
-        <a:defRPr sz="1350" kern="1200">
+      <a:lvl7pPr marL="1543050" algn="l" defTabSz="514350" rtl="0" eaLnBrk="1" latinLnBrk="0" hangingPunct="1">
+        <a:defRPr sz="1013" kern="1200">
           <a:solidFill>
             <a:schemeClr val="tx1"/>
           </a:solidFill>
@@ -2869,8 +2872,8 @@
           <a:cs typeface="+mn-cs"/>
         </a:defRPr>
       </a:lvl7pPr>
-      <a:lvl8pPr marL="2400300" algn="l" defTabSz="685800" rtl="0" eaLnBrk="1" latinLnBrk="0" hangingPunct="1">
-        <a:defRPr sz="1350" kern="1200">
+      <a:lvl8pPr marL="1800225" algn="l" defTabSz="514350" rtl="0" eaLnBrk="1" latinLnBrk="0" hangingPunct="1">
+        <a:defRPr sz="1013" kern="1200">
           <a:solidFill>
             <a:schemeClr val="tx1"/>
           </a:solidFill>
@@ -2879,8 +2882,8 @@
           <a:cs typeface="+mn-cs"/>
         </a:defRPr>
       </a:lvl8pPr>
-      <a:lvl9pPr marL="2743200" algn="l" defTabSz="685800" rtl="0" eaLnBrk="1" latinLnBrk="0" hangingPunct="1">
-        <a:defRPr sz="1350" kern="1200">
+      <a:lvl9pPr marL="2057400" algn="l" defTabSz="514350" rtl="0" eaLnBrk="1" latinLnBrk="0" hangingPunct="1">
+        <a:defRPr sz="1013" kern="1200">
           <a:solidFill>
             <a:schemeClr val="tx1"/>
           </a:solidFill>
@@ -2900,10 +2903,7 @@
     <p:bg>
       <p:bgPr>
         <a:solidFill>
-          <a:schemeClr val="accent2">
-            <a:lumMod val="20000"/>
-            <a:lumOff val="80000"/>
-          </a:schemeClr>
+          <a:schemeClr val="bg1"/>
         </a:solidFill>
         <a:effectLst/>
       </p:bgPr>
@@ -3604,7 +3604,7 @@
 <file path=ppt/theme/theme1.xml><?xml version="1.0" encoding="utf-8"?>
 <a:theme xmlns:a="http://schemas.openxmlformats.org/drawingml/2006/main" name="Office Theme">
   <a:themeElements>
-    <a:clrScheme name="Office Theme">
+    <a:clrScheme name="Office">
       <a:dk1>
         <a:sysClr val="windowText" lastClr="000000"/>
       </a:dk1>
@@ -3642,14 +3642,14 @@
         <a:srgbClr val="954F72"/>
       </a:folHlink>
     </a:clrScheme>
-    <a:fontScheme name="Office Theme">
+    <a:fontScheme name="Office">
       <a:majorFont>
         <a:latin typeface="Calibri Light" panose="020F0302020204030204"/>
         <a:ea typeface=""/>
         <a:cs typeface=""/>
-        <a:font script="Jpan" typeface="游ゴシック Light"/>
+        <a:font script="Jpan" typeface="Yu Gothic Light"/>
         <a:font script="Hang" typeface="맑은 고딕"/>
-        <a:font script="Hans" typeface="等线 Light"/>
+        <a:font script="Hans" typeface="DengXian Light"/>
         <a:font script="Hant" typeface="新細明體"/>
         <a:font script="Arab" typeface="Times New Roman"/>
         <a:font script="Hebr" typeface="Times New Roman"/>
@@ -3682,9 +3682,9 @@
         <a:latin typeface="Calibri" panose="020F0502020204030204"/>
         <a:ea typeface=""/>
         <a:cs typeface=""/>
-        <a:font script="Jpan" typeface="游ゴシック"/>
+        <a:font script="Jpan" typeface="Yu Gothic"/>
         <a:font script="Hang" typeface="맑은 고딕"/>
-        <a:font script="Hans" typeface="等线"/>
+        <a:font script="Hans" typeface="DengXian"/>
         <a:font script="Hant" typeface="新細明體"/>
         <a:font script="Arab" typeface="Arial"/>
         <a:font script="Hebr" typeface="Arial"/>
@@ -3714,7 +3714,7 @@
         <a:font script="Geor" typeface="Sylfaen"/>
       </a:minorFont>
     </a:fontScheme>
-    <a:fmtScheme name="Office Theme">
+    <a:fmtScheme name="Office">
       <a:fillStyleLst>
         <a:solidFill>
           <a:schemeClr val="phClr"/>

</xml_diff>